<commit_message>
Added a few presenter's notes
</commit_message>
<xml_diff>
--- a/slides/crowdsourcing-speech-recognition.pptx
+++ b/slides/crowdsourcing-speech-recognition.pptx
@@ -749,6 +749,7 @@
               </a:p>
             </c:rich>
           </c:tx>
+          <c:layout/>
           <c:overlay val="0"/>
         </c:title>
         <c:numFmt formatCode="General" sourceLinked="1"/>
@@ -817,6 +818,7 @@
               </a:p>
             </c:rich>
           </c:tx>
+          <c:layout/>
           <c:overlay val="0"/>
         </c:title>
         <c:numFmt formatCode="General" sourceLinked="1"/>
@@ -1168,6 +1170,7 @@
               </a:p>
             </c:rich>
           </c:tx>
+          <c:layout/>
           <c:overlay val="0"/>
         </c:title>
         <c:numFmt formatCode="&quot;$&quot;#,##0" sourceLinked="0"/>
@@ -1215,6 +1218,7 @@
               </a:p>
             </c:rich>
           </c:tx>
+          <c:layout/>
           <c:overlay val="0"/>
         </c:title>
         <c:numFmt formatCode="General" sourceLinked="1"/>
@@ -1581,6 +1585,7 @@
               </a:p>
             </c:rich>
           </c:tx>
+          <c:layout/>
           <c:overlay val="0"/>
         </c:title>
         <c:numFmt formatCode="&quot;$&quot;#,##0" sourceLinked="0"/>
@@ -1628,6 +1633,7 @@
               </a:p>
             </c:rich>
           </c:tx>
+          <c:layout/>
           <c:overlay val="0"/>
         </c:title>
         <c:numFmt formatCode="General" sourceLinked="1"/>
@@ -2537,7 +2543,249 @@
           </a:bodyPr>
           <a:lstStyle/>
           <a:p>
-            <a:endParaRPr lang="en-US"/>
+            <a:pPr marL="0" marR="0" indent="0" algn="l" defTabSz="914400" rtl="0" eaLnBrk="1" fontAlgn="base" latinLnBrk="0" hangingPunct="1">
+              <a:lnSpc>
+                <a:spcPct val="100000"/>
+              </a:lnSpc>
+              <a:spcBef>
+                <a:spcPct val="30000"/>
+              </a:spcBef>
+              <a:spcAft>
+                <a:spcPct val="0"/>
+              </a:spcAft>
+              <a:buClrTx/>
+              <a:buSzTx/>
+              <a:buFontTx/>
+              <a:buNone/>
+              <a:tabLst/>
+              <a:defRPr/>
+            </a:pPr>
+            <a:r>
+              <a:rPr lang="en-US" sz="1200" kern="1200" dirty="0" smtClean="0">
+                <a:solidFill>
+                  <a:schemeClr val="tx1"/>
+                </a:solidFill>
+                <a:effectLst/>
+                <a:latin typeface="+mn-lt"/>
+                <a:ea typeface="+mn-ea"/>
+                <a:cs typeface="+mn-cs"/>
+              </a:rPr>
+              <a:t>GREEN are</a:t>
+            </a:r>
+            <a:r>
+              <a:rPr lang="en-US" sz="1200" kern="1200" baseline="0" dirty="0" smtClean="0">
+                <a:solidFill>
+                  <a:schemeClr val="tx1"/>
+                </a:solidFill>
+                <a:effectLst/>
+                <a:latin typeface="+mn-lt"/>
+                <a:ea typeface="+mn-ea"/>
+                <a:cs typeface="+mn-cs"/>
+              </a:rPr>
+              <a:t> CORRECTLY ACCEPTED (true positives).</a:t>
+            </a:r>
+            <a:endParaRPr lang="en-US" sz="1200" kern="1200" dirty="0" smtClean="0">
+              <a:solidFill>
+                <a:schemeClr val="tx1"/>
+              </a:solidFill>
+              <a:effectLst/>
+              <a:latin typeface="+mn-lt"/>
+              <a:ea typeface="+mn-ea"/>
+              <a:cs typeface="+mn-cs"/>
+            </a:endParaRPr>
+          </a:p>
+          <a:p>
+            <a:pPr marL="0" marR="0" indent="0" algn="l" defTabSz="914400" rtl="0" eaLnBrk="1" fontAlgn="base" latinLnBrk="0" hangingPunct="1">
+              <a:lnSpc>
+                <a:spcPct val="100000"/>
+              </a:lnSpc>
+              <a:spcBef>
+                <a:spcPct val="30000"/>
+              </a:spcBef>
+              <a:spcAft>
+                <a:spcPct val="0"/>
+              </a:spcAft>
+              <a:buClrTx/>
+              <a:buSzTx/>
+              <a:buFontTx/>
+              <a:buNone/>
+              <a:tabLst/>
+              <a:defRPr/>
+            </a:pPr>
+            <a:r>
+              <a:rPr lang="en-US" sz="1200" kern="1200" dirty="0" smtClean="0">
+                <a:solidFill>
+                  <a:schemeClr val="tx1"/>
+                </a:solidFill>
+                <a:effectLst/>
+                <a:latin typeface="+mn-lt"/>
+                <a:ea typeface="+mn-ea"/>
+                <a:cs typeface="+mn-cs"/>
+              </a:rPr>
+              <a:t>BLUE</a:t>
+            </a:r>
+            <a:r>
+              <a:rPr lang="en-US" sz="1200" kern="1200" baseline="0" dirty="0" smtClean="0">
+                <a:solidFill>
+                  <a:schemeClr val="tx1"/>
+                </a:solidFill>
+                <a:effectLst/>
+                <a:latin typeface="+mn-lt"/>
+                <a:ea typeface="+mn-ea"/>
+                <a:cs typeface="+mn-cs"/>
+              </a:rPr>
+              <a:t> </a:t>
+            </a:r>
+            <a:r>
+              <a:rPr lang="en-US" sz="1200" kern="1200" dirty="0" smtClean="0">
+                <a:solidFill>
+                  <a:schemeClr val="tx1"/>
+                </a:solidFill>
+                <a:effectLst/>
+                <a:latin typeface="+mn-lt"/>
+                <a:ea typeface="+mn-ea"/>
+                <a:cs typeface="+mn-cs"/>
+              </a:rPr>
+              <a:t>are INCORRECTLY REJECTED (false</a:t>
+            </a:r>
+            <a:r>
+              <a:rPr lang="en-US" sz="1200" kern="1200" baseline="0" dirty="0" smtClean="0">
+                <a:solidFill>
+                  <a:schemeClr val="tx1"/>
+                </a:solidFill>
+                <a:effectLst/>
+                <a:latin typeface="+mn-lt"/>
+                <a:ea typeface="+mn-ea"/>
+                <a:cs typeface="+mn-cs"/>
+              </a:rPr>
+              <a:t> negatives)</a:t>
+            </a:r>
+            <a:r>
+              <a:rPr lang="en-US" sz="1200" kern="1200" dirty="0" smtClean="0">
+                <a:solidFill>
+                  <a:schemeClr val="tx1"/>
+                </a:solidFill>
+                <a:effectLst/>
+                <a:latin typeface="+mn-lt"/>
+                <a:ea typeface="+mn-ea"/>
+                <a:cs typeface="+mn-cs"/>
+              </a:rPr>
+              <a:t>: using their transcripts would have helped, but they don’t hurt system performance, just waste money. </a:t>
+            </a:r>
+          </a:p>
+          <a:p>
+            <a:pPr marL="0" marR="0" indent="0" algn="l" defTabSz="914400" rtl="0" eaLnBrk="1" fontAlgn="base" latinLnBrk="0" hangingPunct="1">
+              <a:lnSpc>
+                <a:spcPct val="100000"/>
+              </a:lnSpc>
+              <a:spcBef>
+                <a:spcPct val="30000"/>
+              </a:spcBef>
+              <a:spcAft>
+                <a:spcPct val="0"/>
+              </a:spcAft>
+              <a:buClrTx/>
+              <a:buSzTx/>
+              <a:buFontTx/>
+              <a:buNone/>
+              <a:tabLst/>
+              <a:defRPr/>
+            </a:pPr>
+            <a:r>
+              <a:rPr lang="en-US" sz="1200" kern="1200" dirty="0" smtClean="0">
+                <a:solidFill>
+                  <a:schemeClr val="tx1"/>
+                </a:solidFill>
+                <a:effectLst/>
+                <a:latin typeface="+mn-lt"/>
+                <a:ea typeface="+mn-ea"/>
+                <a:cs typeface="+mn-cs"/>
+              </a:rPr>
+              <a:t>RED</a:t>
+            </a:r>
+            <a:r>
+              <a:rPr lang="en-US" sz="1200" kern="1200" baseline="0" dirty="0" smtClean="0">
+                <a:solidFill>
+                  <a:schemeClr val="tx1"/>
+                </a:solidFill>
+                <a:effectLst/>
+                <a:latin typeface="+mn-lt"/>
+                <a:ea typeface="+mn-ea"/>
+                <a:cs typeface="+mn-cs"/>
+              </a:rPr>
+              <a:t> are CORRECTLY REJECTED (true negatives) </a:t>
+            </a:r>
+            <a:r>
+              <a:rPr lang="en-US" sz="1200" kern="1200" dirty="0" smtClean="0">
+                <a:solidFill>
+                  <a:schemeClr val="tx1"/>
+                </a:solidFill>
+                <a:effectLst/>
+                <a:latin typeface="+mn-lt"/>
+                <a:ea typeface="+mn-ea"/>
+                <a:cs typeface="+mn-cs"/>
+              </a:rPr>
+              <a:t>for having high disagreement.</a:t>
+            </a:r>
+          </a:p>
+          <a:p>
+            <a:pPr marL="0" marR="0" indent="0" algn="l" defTabSz="914400" rtl="0" eaLnBrk="1" fontAlgn="base" latinLnBrk="0" hangingPunct="1">
+              <a:lnSpc>
+                <a:spcPct val="100000"/>
+              </a:lnSpc>
+              <a:spcBef>
+                <a:spcPct val="30000"/>
+              </a:spcBef>
+              <a:spcAft>
+                <a:spcPct val="0"/>
+              </a:spcAft>
+              <a:buClrTx/>
+              <a:buSzTx/>
+              <a:buFontTx/>
+              <a:buNone/>
+              <a:tabLst/>
+              <a:defRPr/>
+            </a:pPr>
+            <a:r>
+              <a:rPr lang="en-US" sz="1200" kern="1200" dirty="0" smtClean="0">
+                <a:solidFill>
+                  <a:schemeClr val="tx1"/>
+                </a:solidFill>
+                <a:effectLst/>
+                <a:latin typeface="+mn-lt"/>
+                <a:ea typeface="+mn-ea"/>
+                <a:cs typeface="+mn-cs"/>
+              </a:rPr>
+              <a:t>BLCK</a:t>
+            </a:r>
+            <a:r>
+              <a:rPr lang="en-US" sz="1200" kern="1200" baseline="0" dirty="0" smtClean="0">
+                <a:solidFill>
+                  <a:schemeClr val="tx1"/>
+                </a:solidFill>
+                <a:effectLst/>
+                <a:latin typeface="+mn-lt"/>
+                <a:ea typeface="+mn-ea"/>
+                <a:cs typeface="+mn-cs"/>
+              </a:rPr>
+              <a:t> are INCORRECTLY ACCPTED (false positives).  They </a:t>
+            </a:r>
+            <a:r>
+              <a:rPr lang="en-US" sz="1200" kern="1200" dirty="0" smtClean="0">
+                <a:solidFill>
+                  <a:schemeClr val="tx1"/>
+                </a:solidFill>
+                <a:effectLst/>
+                <a:latin typeface="+mn-lt"/>
+                <a:ea typeface="+mn-ea"/>
+                <a:cs typeface="+mn-cs"/>
+              </a:rPr>
+              <a:t>are the trouble- some false positives that are included in training but actually may hurt performance. Luckily, the ratio of false negatives to false positives is usually much larger. </a:t>
+            </a:r>
+            <a:endParaRPr lang="en-US" dirty="0" smtClean="0"/>
+          </a:p>
+          <a:p>
+            <a:endParaRPr lang="en-US" dirty="0"/>
           </a:p>
         </p:txBody>
       </p:sp>
@@ -2624,7 +2872,249 @@
           </a:bodyPr>
           <a:lstStyle/>
           <a:p>
-            <a:endParaRPr lang="en-US"/>
+            <a:pPr marL="0" marR="0" indent="0" algn="l" defTabSz="914400" rtl="0" eaLnBrk="1" fontAlgn="base" latinLnBrk="0" hangingPunct="1">
+              <a:lnSpc>
+                <a:spcPct val="100000"/>
+              </a:lnSpc>
+              <a:spcBef>
+                <a:spcPct val="30000"/>
+              </a:spcBef>
+              <a:spcAft>
+                <a:spcPct val="0"/>
+              </a:spcAft>
+              <a:buClrTx/>
+              <a:buSzTx/>
+              <a:buFontTx/>
+              <a:buNone/>
+              <a:tabLst/>
+              <a:defRPr/>
+            </a:pPr>
+            <a:r>
+              <a:rPr lang="en-US" sz="1200" kern="1200" dirty="0" smtClean="0">
+                <a:solidFill>
+                  <a:schemeClr val="tx1"/>
+                </a:solidFill>
+                <a:effectLst/>
+                <a:latin typeface="+mn-lt"/>
+                <a:ea typeface="+mn-ea"/>
+                <a:cs typeface="+mn-cs"/>
+              </a:rPr>
+              <a:t>GREEN are</a:t>
+            </a:r>
+            <a:r>
+              <a:rPr lang="en-US" sz="1200" kern="1200" baseline="0" dirty="0" smtClean="0">
+                <a:solidFill>
+                  <a:schemeClr val="tx1"/>
+                </a:solidFill>
+                <a:effectLst/>
+                <a:latin typeface="+mn-lt"/>
+                <a:ea typeface="+mn-ea"/>
+                <a:cs typeface="+mn-cs"/>
+              </a:rPr>
+              <a:t> CORRECTLY ACCEPTED (true positives).</a:t>
+            </a:r>
+            <a:endParaRPr lang="en-US" sz="1200" kern="1200" dirty="0" smtClean="0">
+              <a:solidFill>
+                <a:schemeClr val="tx1"/>
+              </a:solidFill>
+              <a:effectLst/>
+              <a:latin typeface="+mn-lt"/>
+              <a:ea typeface="+mn-ea"/>
+              <a:cs typeface="+mn-cs"/>
+            </a:endParaRPr>
+          </a:p>
+          <a:p>
+            <a:pPr marL="0" marR="0" indent="0" algn="l" defTabSz="914400" rtl="0" eaLnBrk="1" fontAlgn="base" latinLnBrk="0" hangingPunct="1">
+              <a:lnSpc>
+                <a:spcPct val="100000"/>
+              </a:lnSpc>
+              <a:spcBef>
+                <a:spcPct val="30000"/>
+              </a:spcBef>
+              <a:spcAft>
+                <a:spcPct val="0"/>
+              </a:spcAft>
+              <a:buClrTx/>
+              <a:buSzTx/>
+              <a:buFontTx/>
+              <a:buNone/>
+              <a:tabLst/>
+              <a:defRPr/>
+            </a:pPr>
+            <a:r>
+              <a:rPr lang="en-US" sz="1200" kern="1200" dirty="0" smtClean="0">
+                <a:solidFill>
+                  <a:schemeClr val="tx1"/>
+                </a:solidFill>
+                <a:effectLst/>
+                <a:latin typeface="+mn-lt"/>
+                <a:ea typeface="+mn-ea"/>
+                <a:cs typeface="+mn-cs"/>
+              </a:rPr>
+              <a:t>BLUE</a:t>
+            </a:r>
+            <a:r>
+              <a:rPr lang="en-US" sz="1200" kern="1200" baseline="0" dirty="0" smtClean="0">
+                <a:solidFill>
+                  <a:schemeClr val="tx1"/>
+                </a:solidFill>
+                <a:effectLst/>
+                <a:latin typeface="+mn-lt"/>
+                <a:ea typeface="+mn-ea"/>
+                <a:cs typeface="+mn-cs"/>
+              </a:rPr>
+              <a:t> </a:t>
+            </a:r>
+            <a:r>
+              <a:rPr lang="en-US" sz="1200" kern="1200" dirty="0" smtClean="0">
+                <a:solidFill>
+                  <a:schemeClr val="tx1"/>
+                </a:solidFill>
+                <a:effectLst/>
+                <a:latin typeface="+mn-lt"/>
+                <a:ea typeface="+mn-ea"/>
+                <a:cs typeface="+mn-cs"/>
+              </a:rPr>
+              <a:t>are INCORRECTLY REJECTED (false</a:t>
+            </a:r>
+            <a:r>
+              <a:rPr lang="en-US" sz="1200" kern="1200" baseline="0" dirty="0" smtClean="0">
+                <a:solidFill>
+                  <a:schemeClr val="tx1"/>
+                </a:solidFill>
+                <a:effectLst/>
+                <a:latin typeface="+mn-lt"/>
+                <a:ea typeface="+mn-ea"/>
+                <a:cs typeface="+mn-cs"/>
+              </a:rPr>
+              <a:t> negatives)</a:t>
+            </a:r>
+            <a:r>
+              <a:rPr lang="en-US" sz="1200" kern="1200" dirty="0" smtClean="0">
+                <a:solidFill>
+                  <a:schemeClr val="tx1"/>
+                </a:solidFill>
+                <a:effectLst/>
+                <a:latin typeface="+mn-lt"/>
+                <a:ea typeface="+mn-ea"/>
+                <a:cs typeface="+mn-cs"/>
+              </a:rPr>
+              <a:t>: using their transcripts would have helped, but they don’t hurt system performance, just waste money. </a:t>
+            </a:r>
+          </a:p>
+          <a:p>
+            <a:pPr marL="0" marR="0" indent="0" algn="l" defTabSz="914400" rtl="0" eaLnBrk="1" fontAlgn="base" latinLnBrk="0" hangingPunct="1">
+              <a:lnSpc>
+                <a:spcPct val="100000"/>
+              </a:lnSpc>
+              <a:spcBef>
+                <a:spcPct val="30000"/>
+              </a:spcBef>
+              <a:spcAft>
+                <a:spcPct val="0"/>
+              </a:spcAft>
+              <a:buClrTx/>
+              <a:buSzTx/>
+              <a:buFontTx/>
+              <a:buNone/>
+              <a:tabLst/>
+              <a:defRPr/>
+            </a:pPr>
+            <a:r>
+              <a:rPr lang="en-US" sz="1200" kern="1200" dirty="0" smtClean="0">
+                <a:solidFill>
+                  <a:schemeClr val="tx1"/>
+                </a:solidFill>
+                <a:effectLst/>
+                <a:latin typeface="+mn-lt"/>
+                <a:ea typeface="+mn-ea"/>
+                <a:cs typeface="+mn-cs"/>
+              </a:rPr>
+              <a:t>RED</a:t>
+            </a:r>
+            <a:r>
+              <a:rPr lang="en-US" sz="1200" kern="1200" baseline="0" dirty="0" smtClean="0">
+                <a:solidFill>
+                  <a:schemeClr val="tx1"/>
+                </a:solidFill>
+                <a:effectLst/>
+                <a:latin typeface="+mn-lt"/>
+                <a:ea typeface="+mn-ea"/>
+                <a:cs typeface="+mn-cs"/>
+              </a:rPr>
+              <a:t> are CORRECTLY REJECTED (true negatives) </a:t>
+            </a:r>
+            <a:r>
+              <a:rPr lang="en-US" sz="1200" kern="1200" dirty="0" smtClean="0">
+                <a:solidFill>
+                  <a:schemeClr val="tx1"/>
+                </a:solidFill>
+                <a:effectLst/>
+                <a:latin typeface="+mn-lt"/>
+                <a:ea typeface="+mn-ea"/>
+                <a:cs typeface="+mn-cs"/>
+              </a:rPr>
+              <a:t>for having high disagreement.</a:t>
+            </a:r>
+          </a:p>
+          <a:p>
+            <a:pPr marL="0" marR="0" indent="0" algn="l" defTabSz="914400" rtl="0" eaLnBrk="1" fontAlgn="base" latinLnBrk="0" hangingPunct="1">
+              <a:lnSpc>
+                <a:spcPct val="100000"/>
+              </a:lnSpc>
+              <a:spcBef>
+                <a:spcPct val="30000"/>
+              </a:spcBef>
+              <a:spcAft>
+                <a:spcPct val="0"/>
+              </a:spcAft>
+              <a:buClrTx/>
+              <a:buSzTx/>
+              <a:buFontTx/>
+              <a:buNone/>
+              <a:tabLst/>
+              <a:defRPr/>
+            </a:pPr>
+            <a:r>
+              <a:rPr lang="en-US" sz="1200" kern="1200" dirty="0" smtClean="0">
+                <a:solidFill>
+                  <a:schemeClr val="tx1"/>
+                </a:solidFill>
+                <a:effectLst/>
+                <a:latin typeface="+mn-lt"/>
+                <a:ea typeface="+mn-ea"/>
+                <a:cs typeface="+mn-cs"/>
+              </a:rPr>
+              <a:t>BLCK</a:t>
+            </a:r>
+            <a:r>
+              <a:rPr lang="en-US" sz="1200" kern="1200" baseline="0" dirty="0" smtClean="0">
+                <a:solidFill>
+                  <a:schemeClr val="tx1"/>
+                </a:solidFill>
+                <a:effectLst/>
+                <a:latin typeface="+mn-lt"/>
+                <a:ea typeface="+mn-ea"/>
+                <a:cs typeface="+mn-cs"/>
+              </a:rPr>
+              <a:t> are INCORRECTLY ACCPTED (false positives).  They </a:t>
+            </a:r>
+            <a:r>
+              <a:rPr lang="en-US" sz="1200" kern="1200" dirty="0" smtClean="0">
+                <a:solidFill>
+                  <a:schemeClr val="tx1"/>
+                </a:solidFill>
+                <a:effectLst/>
+                <a:latin typeface="+mn-lt"/>
+                <a:ea typeface="+mn-ea"/>
+                <a:cs typeface="+mn-cs"/>
+              </a:rPr>
+              <a:t>are the trouble- some false positives that are included in training but actually may hurt performance. Luckily, the ratio of false negatives to false positives is usually much larger. </a:t>
+            </a:r>
+            <a:endParaRPr lang="en-US" dirty="0" smtClean="0"/>
+          </a:p>
+          <a:p>
+            <a:endParaRPr lang="en-US" dirty="0"/>
           </a:p>
         </p:txBody>
       </p:sp>
@@ -14756,7 +15246,7 @@
           <a:graphicData uri="http://schemas.openxmlformats.org/presentationml/2006/ole">
             <mc:AlternateContent xmlns:mc="http://schemas.openxmlformats.org/markup-compatibility/2006">
               <mc:Choice xmlns:v="urn:schemas-microsoft-com:vml" Requires="v">
-                <p:oleObj spid="_x0000_s251916" name="Equation" r:id="rId3" imgW="2616120" imgH="419040" progId="Equation.3">
+                <p:oleObj spid="_x0000_s251918" name="Equation" r:id="rId3" imgW="2616120" imgH="419040" progId="Equation.3">
                   <p:embed/>
                 </p:oleObj>
               </mc:Choice>
@@ -15947,7 +16437,7 @@
           <a:graphicData uri="http://schemas.openxmlformats.org/presentationml/2006/ole">
             <mc:AlternateContent xmlns:mc="http://schemas.openxmlformats.org/markup-compatibility/2006">
               <mc:Choice xmlns:v="urn:schemas-microsoft-com:vml" Requires="v">
-                <p:oleObj spid="_x0000_s252940" name="Equation" r:id="rId3" imgW="2616120" imgH="419040" progId="Equation.3">
+                <p:oleObj spid="_x0000_s252942" name="Equation" r:id="rId3" imgW="2616120" imgH="419040" progId="Equation.3">
                   <p:embed/>
                 </p:oleObj>
               </mc:Choice>
@@ -19138,7 +19628,15 @@
           <a:p>
             <a:r>
               <a:rPr lang="en-US" dirty="0" smtClean="0"/>
-              <a:t>Some people complained about the cost </a:t>
+              <a:t>Some people </a:t>
+            </a:r>
+            <a:r>
+              <a:rPr lang="en-US" dirty="0" smtClean="0"/>
+              <a:t>rightfully complained </a:t>
+            </a:r>
+            <a:r>
+              <a:rPr lang="en-US" dirty="0" smtClean="0"/>
+              <a:t>about the cost </a:t>
             </a:r>
             <a:endParaRPr lang="en-US" i="1" dirty="0" smtClean="0"/>
           </a:p>
@@ -19769,7 +20267,7 @@
             <a:graphicData uri="http://schemas.openxmlformats.org/presentationml/2006/ole">
               <mc:AlternateContent xmlns:mc="http://schemas.openxmlformats.org/markup-compatibility/2006">
                 <mc:Choice xmlns:v="urn:schemas-microsoft-com:vml" Requires="v">
-                  <p:oleObj spid="_x0000_s161832" name="Acrobat Document" r:id="rId4" imgW="4171320" imgH="4176000" progId="AcroExch.Document.7">
+                  <p:oleObj spid="_x0000_s161834" name="Acrobat Document" r:id="rId4" imgW="4171320" imgH="4176000" progId="AcroExch.Document.7">
                     <p:embed/>
                   </p:oleObj>
                 </mc:Choice>
@@ -20556,7 +21054,7 @@
             <a:graphicData uri="http://schemas.openxmlformats.org/presentationml/2006/ole">
               <mc:AlternateContent xmlns:mc="http://schemas.openxmlformats.org/markup-compatibility/2006">
                 <mc:Choice xmlns:v="urn:schemas-microsoft-com:vml" Requires="v">
-                  <p:oleObj spid="_x0000_s121889" name="Acrobat Document" r:id="rId4" imgW="4171320" imgH="4176000" progId="AcroExch.Document.7">
+                  <p:oleObj spid="_x0000_s121891" name="Acrobat Document" r:id="rId4" imgW="4171320" imgH="4176000" progId="AcroExch.Document.7">
                     <p:embed/>
                   </p:oleObj>
                 </mc:Choice>
@@ -20945,7 +21443,7 @@
             <a:graphicData uri="http://schemas.openxmlformats.org/presentationml/2006/ole">
               <mc:AlternateContent xmlns:mc="http://schemas.openxmlformats.org/markup-compatibility/2006">
                 <mc:Choice xmlns:v="urn:schemas-microsoft-com:vml" Requires="v">
-                  <p:oleObj spid="_x0000_s176160" name="Acrobat Document" r:id="rId4" imgW="4171320" imgH="4176000" progId="AcroExch.Document.7">
+                  <p:oleObj spid="_x0000_s176162" name="Acrobat Document" r:id="rId4" imgW="4171320" imgH="4176000" progId="AcroExch.Document.7">
                     <p:embed/>
                   </p:oleObj>
                 </mc:Choice>
@@ -21472,7 +21970,7 @@
           <a:graphicData uri="http://schemas.openxmlformats.org/presentationml/2006/ole">
             <mc:AlternateContent xmlns:mc="http://schemas.openxmlformats.org/markup-compatibility/2006">
               <mc:Choice xmlns:v="urn:schemas-microsoft-com:vml" Requires="v">
-                <p:oleObj spid="_x0000_s124961" name="Acrobat Document" r:id="rId4" imgW="4171320" imgH="4176000" progId="AcroExch.Document.7">
+                <p:oleObj spid="_x0000_s124963" name="Acrobat Document" r:id="rId4" imgW="4171320" imgH="4176000" progId="AcroExch.Document.7">
                   <p:embed/>
                 </p:oleObj>
               </mc:Choice>
@@ -21929,7 +22427,7 @@
             <a:graphicData uri="http://schemas.openxmlformats.org/presentationml/2006/ole">
               <mc:AlternateContent xmlns:mc="http://schemas.openxmlformats.org/markup-compatibility/2006">
                 <mc:Choice xmlns:v="urn:schemas-microsoft-com:vml" Requires="v">
-                  <p:oleObj spid="_x0000_s207903" name="Acrobat Document" r:id="rId4" imgW="4171320" imgH="4176000" progId="AcroExch.Document.7">
+                  <p:oleObj spid="_x0000_s207905" name="Acrobat Document" r:id="rId4" imgW="4171320" imgH="4176000" progId="AcroExch.Document.7">
                     <p:embed/>
                   </p:oleObj>
                 </mc:Choice>
@@ -22120,7 +22618,7 @@
           <a:graphicData uri="http://schemas.openxmlformats.org/presentationml/2006/ole">
             <mc:AlternateContent xmlns:mc="http://schemas.openxmlformats.org/markup-compatibility/2006">
               <mc:Choice xmlns:v="urn:schemas-microsoft-com:vml" Requires="v">
-                <p:oleObj spid="_x0000_s210975" name="Acrobat Document" r:id="rId4" imgW="4171320" imgH="4176000" progId="AcroExch.Document.7">
+                <p:oleObj spid="_x0000_s210977" name="Acrobat Document" r:id="rId4" imgW="4171320" imgH="4176000" progId="AcroExch.Document.7">
                   <p:embed/>
                 </p:oleObj>
               </mc:Choice>
@@ -22534,7 +23032,7 @@
             <a:graphicData uri="http://schemas.openxmlformats.org/presentationml/2006/ole">
               <mc:AlternateContent xmlns:mc="http://schemas.openxmlformats.org/markup-compatibility/2006">
                 <mc:Choice xmlns:v="urn:schemas-microsoft-com:vml" Requires="v">
-                  <p:oleObj spid="_x0000_s206880" name="Acrobat Document" r:id="rId4" imgW="4171320" imgH="4176000" progId="AcroExch.Document.7">
+                  <p:oleObj spid="_x0000_s206882" name="Acrobat Document" r:id="rId4" imgW="4171320" imgH="4176000" progId="AcroExch.Document.7">
                     <p:embed/>
                   </p:oleObj>
                 </mc:Choice>
@@ -22699,7 +23197,7 @@
           <a:graphicData uri="http://schemas.openxmlformats.org/presentationml/2006/ole">
             <mc:AlternateContent xmlns:mc="http://schemas.openxmlformats.org/markup-compatibility/2006">
               <mc:Choice xmlns:v="urn:schemas-microsoft-com:vml" Requires="v">
-                <p:oleObj spid="_x0000_s177190" name="Acrobat Document" r:id="rId4" imgW="4171320" imgH="4176000" progId="AcroExch.Document.7">
+                <p:oleObj spid="_x0000_s177192" name="Acrobat Document" r:id="rId4" imgW="4171320" imgH="4176000" progId="AcroExch.Document.7">
                   <p:embed/>
                 </p:oleObj>
               </mc:Choice>
@@ -22923,7 +23421,7 @@
             <a:graphicData uri="http://schemas.openxmlformats.org/presentationml/2006/ole">
               <mc:AlternateContent xmlns:mc="http://schemas.openxmlformats.org/markup-compatibility/2006">
                 <mc:Choice xmlns:v="urn:schemas-microsoft-com:vml" Requires="v">
-                  <p:oleObj spid="_x0000_s208928" name="Acrobat Document" r:id="rId4" imgW="4171320" imgH="4176000" progId="AcroExch.Document.7">
+                  <p:oleObj spid="_x0000_s208930" name="Acrobat Document" r:id="rId4" imgW="4171320" imgH="4176000" progId="AcroExch.Document.7">
                     <p:embed/>
                   </p:oleObj>
                 </mc:Choice>
@@ -23203,7 +23701,7 @@
           <a:graphicData uri="http://schemas.openxmlformats.org/presentationml/2006/ole">
             <mc:AlternateContent xmlns:mc="http://schemas.openxmlformats.org/markup-compatibility/2006">
               <mc:Choice xmlns:v="urn:schemas-microsoft-com:vml" Requires="v">
-                <p:oleObj spid="_x0000_s127011" name="Acrobat Document" r:id="rId4" imgW="4171320" imgH="4176000" progId="AcroExch.Document.7">
+                <p:oleObj spid="_x0000_s127013" name="Acrobat Document" r:id="rId4" imgW="4171320" imgH="4176000" progId="AcroExch.Document.7">
                   <p:embed/>
                 </p:oleObj>
               </mc:Choice>
@@ -23420,7 +23918,7 @@
           <a:graphicData uri="http://schemas.openxmlformats.org/presentationml/2006/ole">
             <mc:AlternateContent xmlns:mc="http://schemas.openxmlformats.org/markup-compatibility/2006">
               <mc:Choice xmlns:v="urn:schemas-microsoft-com:vml" Requires="v">
-                <p:oleObj spid="_x0000_s209951" name="Acrobat Document" r:id="rId4" imgW="4171320" imgH="4176000" progId="AcroExch.Document.7">
+                <p:oleObj spid="_x0000_s209953" name="Acrobat Document" r:id="rId4" imgW="4171320" imgH="4176000" progId="AcroExch.Document.7">
                   <p:embed/>
                 </p:oleObj>
               </mc:Choice>
@@ -23661,7 +24159,7 @@
           <a:graphicData uri="http://schemas.openxmlformats.org/presentationml/2006/ole">
             <mc:AlternateContent xmlns:mc="http://schemas.openxmlformats.org/markup-compatibility/2006">
               <mc:Choice xmlns:v="urn:schemas-microsoft-com:vml" Requires="v">
-                <p:oleObj spid="_x0000_s223263" name="Acrobat Document" r:id="rId4" imgW="4171320" imgH="4176000" progId="AcroExch.Document.7">
+                <p:oleObj spid="_x0000_s223265" name="Acrobat Document" r:id="rId4" imgW="4171320" imgH="4176000" progId="AcroExch.Document.7">
                   <p:embed/>
                 </p:oleObj>
               </mc:Choice>
@@ -32329,7 +32827,7 @@
           <a:graphicData uri="http://schemas.openxmlformats.org/presentationml/2006/ole">
             <mc:AlternateContent xmlns:mc="http://schemas.openxmlformats.org/markup-compatibility/2006">
               <mc:Choice xmlns:v="urn:schemas-microsoft-com:vml" Requires="v">
-                <p:oleObj spid="_x0000_s123938" name="Acrobat Document" r:id="rId4" imgW="4171320" imgH="4176000" progId="AcroExch.Document.7">
+                <p:oleObj spid="_x0000_s123940" name="Acrobat Document" r:id="rId4" imgW="4171320" imgH="4176000" progId="AcroExch.Document.7">
                   <p:embed/>
                 </p:oleObj>
               </mc:Choice>

</xml_diff>